<commit_message>
updates in exp setup and methods
</commit_message>
<xml_diff>
--- a/images/LCLS-timing-schematic.pptx
+++ b/images/LCLS-timing-schematic.pptx
@@ -104,6 +104,11 @@
       </a:defRPr>
     </a:lvl9pPr>
   </p:defaultTextStyle>
+  <p:extLst>
+    <p:ext uri="{EFAFB233-063F-42B5-8137-9DF3F51BA10A}">
+      <p15:sldGuideLst xmlns:p15="http://schemas.microsoft.com/office/powerpoint/2012/main"/>
+    </p:ext>
+  </p:extLst>
 </p:presentation>
 </file>
 
@@ -238,7 +243,7 @@
           <a:p>
             <a:fld id="{3083FB03-745E-4E41-8ABA-E3A534DF5279}" type="datetimeFigureOut">
               <a:rPr lang="en-US" smtClean="0"/>
-              <a:t>10/27/16</a:t>
+              <a:t>10/30/16</a:t>
             </a:fld>
             <a:endParaRPr lang="en-US"/>
           </a:p>
@@ -408,7 +413,7 @@
           <a:p>
             <a:fld id="{3083FB03-745E-4E41-8ABA-E3A534DF5279}" type="datetimeFigureOut">
               <a:rPr lang="en-US" smtClean="0"/>
-              <a:t>10/27/16</a:t>
+              <a:t>10/30/16</a:t>
             </a:fld>
             <a:endParaRPr lang="en-US"/>
           </a:p>
@@ -588,7 +593,7 @@
           <a:p>
             <a:fld id="{3083FB03-745E-4E41-8ABA-E3A534DF5279}" type="datetimeFigureOut">
               <a:rPr lang="en-US" smtClean="0"/>
-              <a:t>10/27/16</a:t>
+              <a:t>10/30/16</a:t>
             </a:fld>
             <a:endParaRPr lang="en-US"/>
           </a:p>
@@ -758,7 +763,7 @@
           <a:p>
             <a:fld id="{3083FB03-745E-4E41-8ABA-E3A534DF5279}" type="datetimeFigureOut">
               <a:rPr lang="en-US" smtClean="0"/>
-              <a:t>10/27/16</a:t>
+              <a:t>10/30/16</a:t>
             </a:fld>
             <a:endParaRPr lang="en-US"/>
           </a:p>
@@ -1004,7 +1009,7 @@
           <a:p>
             <a:fld id="{3083FB03-745E-4E41-8ABA-E3A534DF5279}" type="datetimeFigureOut">
               <a:rPr lang="en-US" smtClean="0"/>
-              <a:t>10/27/16</a:t>
+              <a:t>10/30/16</a:t>
             </a:fld>
             <a:endParaRPr lang="en-US"/>
           </a:p>
@@ -1236,7 +1241,7 @@
           <a:p>
             <a:fld id="{3083FB03-745E-4E41-8ABA-E3A534DF5279}" type="datetimeFigureOut">
               <a:rPr lang="en-US" smtClean="0"/>
-              <a:t>10/27/16</a:t>
+              <a:t>10/30/16</a:t>
             </a:fld>
             <a:endParaRPr lang="en-US"/>
           </a:p>
@@ -1603,7 +1608,7 @@
           <a:p>
             <a:fld id="{3083FB03-745E-4E41-8ABA-E3A534DF5279}" type="datetimeFigureOut">
               <a:rPr lang="en-US" smtClean="0"/>
-              <a:t>10/27/16</a:t>
+              <a:t>10/30/16</a:t>
             </a:fld>
             <a:endParaRPr lang="en-US"/>
           </a:p>
@@ -1721,7 +1726,7 @@
           <a:p>
             <a:fld id="{3083FB03-745E-4E41-8ABA-E3A534DF5279}" type="datetimeFigureOut">
               <a:rPr lang="en-US" smtClean="0"/>
-              <a:t>10/27/16</a:t>
+              <a:t>10/30/16</a:t>
             </a:fld>
             <a:endParaRPr lang="en-US"/>
           </a:p>
@@ -1816,7 +1821,7 @@
           <a:p>
             <a:fld id="{3083FB03-745E-4E41-8ABA-E3A534DF5279}" type="datetimeFigureOut">
               <a:rPr lang="en-US" smtClean="0"/>
-              <a:t>10/27/16</a:t>
+              <a:t>10/30/16</a:t>
             </a:fld>
             <a:endParaRPr lang="en-US"/>
           </a:p>
@@ -2093,7 +2098,7 @@
           <a:p>
             <a:fld id="{3083FB03-745E-4E41-8ABA-E3A534DF5279}" type="datetimeFigureOut">
               <a:rPr lang="en-US" smtClean="0"/>
-              <a:t>10/27/16</a:t>
+              <a:t>10/30/16</a:t>
             </a:fld>
             <a:endParaRPr lang="en-US"/>
           </a:p>
@@ -2346,7 +2351,7 @@
           <a:p>
             <a:fld id="{3083FB03-745E-4E41-8ABA-E3A534DF5279}" type="datetimeFigureOut">
               <a:rPr lang="en-US" smtClean="0"/>
-              <a:t>10/27/16</a:t>
+              <a:t>10/30/16</a:t>
             </a:fld>
             <a:endParaRPr lang="en-US"/>
           </a:p>
@@ -2559,7 +2564,7 @@
           <a:p>
             <a:fld id="{3083FB03-745E-4E41-8ABA-E3A534DF5279}" type="datetimeFigureOut">
               <a:rPr lang="en-US" smtClean="0"/>
-              <a:t>10/27/16</a:t>
+              <a:t>10/30/16</a:t>
             </a:fld>
             <a:endParaRPr lang="en-US"/>
           </a:p>
@@ -3182,13 +3187,13 @@
           </p:spPr>
           <p:style>
             <a:lnRef idx="3">
-              <a:schemeClr val="accent5"/>
+              <a:schemeClr val="accent3"/>
             </a:lnRef>
             <a:fillRef idx="0">
-              <a:schemeClr val="accent5"/>
+              <a:schemeClr val="accent3"/>
             </a:fillRef>
             <a:effectRef idx="2">
-              <a:schemeClr val="accent5"/>
+              <a:schemeClr val="accent3"/>
             </a:effectRef>
             <a:fontRef idx="minor">
               <a:schemeClr val="tx1"/>
@@ -3385,7 +3390,7 @@
           <p:spPr>
             <a:xfrm>
               <a:off x="5580994" y="1849824"/>
-              <a:ext cx="477054" cy="369332"/>
+              <a:ext cx="591316" cy="369332"/>
             </a:xfrm>
             <a:prstGeom prst="rect">
               <a:avLst/>
@@ -3404,7 +3409,7 @@
               </a:r>
               <a:r>
                 <a:rPr lang="en-US" baseline="-25000" dirty="0" err="1" smtClean="0"/>
-                <a:t>des</a:t>
+                <a:t>delay</a:t>
               </a:r>
               <a:endParaRPr lang="en-US" baseline="-25000" dirty="0"/>
             </a:p>
@@ -3433,11 +3438,11 @@
             <a:lstStyle/>
             <a:p>
               <a:r>
-                <a:rPr lang="en-US" smtClean="0"/>
+                <a:rPr lang="en-US" dirty="0" err="1" smtClean="0"/>
                 <a:t>t</a:t>
               </a:r>
               <a:r>
-                <a:rPr lang="en-US" baseline="-25000" smtClean="0"/>
+                <a:rPr lang="en-US" baseline="-25000" dirty="0" err="1" smtClean="0"/>
                 <a:t>gas</a:t>
               </a:r>
               <a:r>

</xml_diff>